<commit_message>
pre-experiment w/ nonzero initial conditions
</commit_message>
<xml_diff>
--- a/tempo.pptx
+++ b/tempo.pptx
@@ -5,10 +5,11 @@
     <p:sldMasterId id="2147483648" r:id="rId1"/>
   </p:sldMasterIdLst>
   <p:sldIdLst>
-    <p:sldId id="256" r:id="rId2"/>
-    <p:sldId id="257" r:id="rId3"/>
-    <p:sldId id="258" r:id="rId4"/>
-    <p:sldId id="259" r:id="rId5"/>
+    <p:sldId id="260" r:id="rId2"/>
+    <p:sldId id="256" r:id="rId3"/>
+    <p:sldId id="257" r:id="rId4"/>
+    <p:sldId id="258" r:id="rId5"/>
+    <p:sldId id="259" r:id="rId6"/>
   </p:sldIdLst>
   <p:sldSz cx="12192000" cy="6858000"/>
   <p:notesSz cx="6858000" cy="9144000"/>
@@ -262,7 +263,7 @@
           <a:p>
             <a:fld id="{AFA471EA-8F32-4CD3-A574-0065AA557F40}" type="datetimeFigureOut">
               <a:rPr lang="zh-CN" altLang="en-US" smtClean="0"/>
-              <a:t>2024/10/1</a:t>
+              <a:t>2024/10/2</a:t>
             </a:fld>
             <a:endParaRPr lang="zh-CN" altLang="en-US"/>
           </a:p>
@@ -460,7 +461,7 @@
           <a:p>
             <a:fld id="{AFA471EA-8F32-4CD3-A574-0065AA557F40}" type="datetimeFigureOut">
               <a:rPr lang="zh-CN" altLang="en-US" smtClean="0"/>
-              <a:t>2024/10/1</a:t>
+              <a:t>2024/10/2</a:t>
             </a:fld>
             <a:endParaRPr lang="zh-CN" altLang="en-US"/>
           </a:p>
@@ -668,7 +669,7 @@
           <a:p>
             <a:fld id="{AFA471EA-8F32-4CD3-A574-0065AA557F40}" type="datetimeFigureOut">
               <a:rPr lang="zh-CN" altLang="en-US" smtClean="0"/>
-              <a:t>2024/10/1</a:t>
+              <a:t>2024/10/2</a:t>
             </a:fld>
             <a:endParaRPr lang="zh-CN" altLang="en-US"/>
           </a:p>
@@ -866,7 +867,7 @@
           <a:p>
             <a:fld id="{AFA471EA-8F32-4CD3-A574-0065AA557F40}" type="datetimeFigureOut">
               <a:rPr lang="zh-CN" altLang="en-US" smtClean="0"/>
-              <a:t>2024/10/1</a:t>
+              <a:t>2024/10/2</a:t>
             </a:fld>
             <a:endParaRPr lang="zh-CN" altLang="en-US"/>
           </a:p>
@@ -1141,7 +1142,7 @@
           <a:p>
             <a:fld id="{AFA471EA-8F32-4CD3-A574-0065AA557F40}" type="datetimeFigureOut">
               <a:rPr lang="zh-CN" altLang="en-US" smtClean="0"/>
-              <a:t>2024/10/1</a:t>
+              <a:t>2024/10/2</a:t>
             </a:fld>
             <a:endParaRPr lang="zh-CN" altLang="en-US"/>
           </a:p>
@@ -1406,7 +1407,7 @@
           <a:p>
             <a:fld id="{AFA471EA-8F32-4CD3-A574-0065AA557F40}" type="datetimeFigureOut">
               <a:rPr lang="zh-CN" altLang="en-US" smtClean="0"/>
-              <a:t>2024/10/1</a:t>
+              <a:t>2024/10/2</a:t>
             </a:fld>
             <a:endParaRPr lang="zh-CN" altLang="en-US"/>
           </a:p>
@@ -1818,7 +1819,7 @@
           <a:p>
             <a:fld id="{AFA471EA-8F32-4CD3-A574-0065AA557F40}" type="datetimeFigureOut">
               <a:rPr lang="zh-CN" altLang="en-US" smtClean="0"/>
-              <a:t>2024/10/1</a:t>
+              <a:t>2024/10/2</a:t>
             </a:fld>
             <a:endParaRPr lang="zh-CN" altLang="en-US"/>
           </a:p>
@@ -1959,7 +1960,7 @@
           <a:p>
             <a:fld id="{AFA471EA-8F32-4CD3-A574-0065AA557F40}" type="datetimeFigureOut">
               <a:rPr lang="zh-CN" altLang="en-US" smtClean="0"/>
-              <a:t>2024/10/1</a:t>
+              <a:t>2024/10/2</a:t>
             </a:fld>
             <a:endParaRPr lang="zh-CN" altLang="en-US"/>
           </a:p>
@@ -2072,7 +2073,7 @@
           <a:p>
             <a:fld id="{AFA471EA-8F32-4CD3-A574-0065AA557F40}" type="datetimeFigureOut">
               <a:rPr lang="zh-CN" altLang="en-US" smtClean="0"/>
-              <a:t>2024/10/1</a:t>
+              <a:t>2024/10/2</a:t>
             </a:fld>
             <a:endParaRPr lang="zh-CN" altLang="en-US"/>
           </a:p>
@@ -2383,7 +2384,7 @@
           <a:p>
             <a:fld id="{AFA471EA-8F32-4CD3-A574-0065AA557F40}" type="datetimeFigureOut">
               <a:rPr lang="zh-CN" altLang="en-US" smtClean="0"/>
-              <a:t>2024/10/1</a:t>
+              <a:t>2024/10/2</a:t>
             </a:fld>
             <a:endParaRPr lang="zh-CN" altLang="en-US"/>
           </a:p>
@@ -2671,7 +2672,7 @@
           <a:p>
             <a:fld id="{AFA471EA-8F32-4CD3-A574-0065AA557F40}" type="datetimeFigureOut">
               <a:rPr lang="zh-CN" altLang="en-US" smtClean="0"/>
-              <a:t>2024/10/1</a:t>
+              <a:t>2024/10/2</a:t>
             </a:fld>
             <a:endParaRPr lang="zh-CN" altLang="en-US"/>
           </a:p>
@@ -2912,7 +2913,7 @@
           <a:p>
             <a:fld id="{AFA471EA-8F32-4CD3-A574-0065AA557F40}" type="datetimeFigureOut">
               <a:rPr lang="zh-CN" altLang="en-US" smtClean="0"/>
-              <a:t>2024/10/1</a:t>
+              <a:t>2024/10/2</a:t>
             </a:fld>
             <a:endParaRPr lang="zh-CN" altLang="en-US"/>
           </a:p>
@@ -3331,6 +3332,756 @@
       </p:grpSpPr>
       <p:pic>
         <p:nvPicPr>
+          <p:cNvPr id="5" name="图片 4">
+            <a:extLst>
+              <a:ext uri="{FF2B5EF4-FFF2-40B4-BE49-F238E27FC236}">
+                <a16:creationId xmlns:a16="http://schemas.microsoft.com/office/drawing/2014/main" id="{46C1ECE9-1F62-5647-5317-D4E7BA34791A}"/>
+              </a:ext>
+            </a:extLst>
+          </p:cNvPr>
+          <p:cNvPicPr>
+            <a:picLocks noChangeAspect="1"/>
+          </p:cNvPicPr>
+          <p:nvPr/>
+        </p:nvPicPr>
+        <p:blipFill>
+          <a:blip r:embed="rId2">
+            <a:extLst>
+              <a:ext uri="{28A0092B-C50C-407E-A947-70E740481C1C}">
+                <a14:useLocalDpi xmlns:a14="http://schemas.microsoft.com/office/drawing/2010/main" val="0"/>
+              </a:ext>
+            </a:extLst>
+          </a:blip>
+          <a:stretch>
+            <a:fillRect/>
+          </a:stretch>
+        </p:blipFill>
+        <p:spPr>
+          <a:xfrm>
+            <a:off x="1" y="0"/>
+            <a:ext cx="2978870" cy="2234152"/>
+          </a:xfrm>
+          <a:prstGeom prst="rect">
+            <a:avLst/>
+          </a:prstGeom>
+        </p:spPr>
+      </p:pic>
+      <p:pic>
+        <p:nvPicPr>
+          <p:cNvPr id="7" name="图片 6">
+            <a:extLst>
+              <a:ext uri="{FF2B5EF4-FFF2-40B4-BE49-F238E27FC236}">
+                <a16:creationId xmlns:a16="http://schemas.microsoft.com/office/drawing/2014/main" id="{32A0AC7D-A712-B564-F568-A60D56418C2D}"/>
+              </a:ext>
+            </a:extLst>
+          </p:cNvPr>
+          <p:cNvPicPr>
+            <a:picLocks noChangeAspect="1"/>
+          </p:cNvPicPr>
+          <p:nvPr/>
+        </p:nvPicPr>
+        <p:blipFill>
+          <a:blip r:embed="rId3">
+            <a:extLst>
+              <a:ext uri="{28A0092B-C50C-407E-A947-70E740481C1C}">
+                <a14:useLocalDpi xmlns:a14="http://schemas.microsoft.com/office/drawing/2010/main" val="0"/>
+              </a:ext>
+            </a:extLst>
+          </a:blip>
+          <a:stretch>
+            <a:fillRect/>
+          </a:stretch>
+        </p:blipFill>
+        <p:spPr>
+          <a:xfrm>
+            <a:off x="2878318" y="-1"/>
+            <a:ext cx="2978870" cy="2234153"/>
+          </a:xfrm>
+          <a:prstGeom prst="rect">
+            <a:avLst/>
+          </a:prstGeom>
+        </p:spPr>
+      </p:pic>
+      <p:pic>
+        <p:nvPicPr>
+          <p:cNvPr id="9" name="图片 8">
+            <a:extLst>
+              <a:ext uri="{FF2B5EF4-FFF2-40B4-BE49-F238E27FC236}">
+                <a16:creationId xmlns:a16="http://schemas.microsoft.com/office/drawing/2014/main" id="{801FE15B-EAF3-33BB-1497-DB7F87014626}"/>
+              </a:ext>
+            </a:extLst>
+          </p:cNvPr>
+          <p:cNvPicPr>
+            <a:picLocks noChangeAspect="1"/>
+          </p:cNvPicPr>
+          <p:nvPr/>
+        </p:nvPicPr>
+        <p:blipFill>
+          <a:blip r:embed="rId4">
+            <a:extLst>
+              <a:ext uri="{28A0092B-C50C-407E-A947-70E740481C1C}">
+                <a14:useLocalDpi xmlns:a14="http://schemas.microsoft.com/office/drawing/2010/main" val="0"/>
+              </a:ext>
+            </a:extLst>
+          </a:blip>
+          <a:stretch>
+            <a:fillRect/>
+          </a:stretch>
+        </p:blipFill>
+        <p:spPr>
+          <a:xfrm>
+            <a:off x="5620883" y="-2"/>
+            <a:ext cx="2978871" cy="2234153"/>
+          </a:xfrm>
+          <a:prstGeom prst="rect">
+            <a:avLst/>
+          </a:prstGeom>
+        </p:spPr>
+      </p:pic>
+      <p:pic>
+        <p:nvPicPr>
+          <p:cNvPr id="11" name="图片 10">
+            <a:extLst>
+              <a:ext uri="{FF2B5EF4-FFF2-40B4-BE49-F238E27FC236}">
+                <a16:creationId xmlns:a16="http://schemas.microsoft.com/office/drawing/2014/main" id="{06090E9B-1F16-8C2A-ACB9-CC7472B26348}"/>
+              </a:ext>
+            </a:extLst>
+          </p:cNvPr>
+          <p:cNvPicPr>
+            <a:picLocks noChangeAspect="1"/>
+          </p:cNvPicPr>
+          <p:nvPr/>
+        </p:nvPicPr>
+        <p:blipFill>
+          <a:blip r:embed="rId5">
+            <a:extLst>
+              <a:ext uri="{28A0092B-C50C-407E-A947-70E740481C1C}">
+                <a14:useLocalDpi xmlns:a14="http://schemas.microsoft.com/office/drawing/2010/main" val="0"/>
+              </a:ext>
+            </a:extLst>
+          </a:blip>
+          <a:stretch>
+            <a:fillRect/>
+          </a:stretch>
+        </p:blipFill>
+        <p:spPr>
+          <a:xfrm>
+            <a:off x="8499200" y="0"/>
+            <a:ext cx="2978870" cy="2234153"/>
+          </a:xfrm>
+          <a:prstGeom prst="rect">
+            <a:avLst/>
+          </a:prstGeom>
+        </p:spPr>
+      </p:pic>
+      <p:pic>
+        <p:nvPicPr>
+          <p:cNvPr id="13" name="图片 12">
+            <a:extLst>
+              <a:ext uri="{FF2B5EF4-FFF2-40B4-BE49-F238E27FC236}">
+                <a16:creationId xmlns:a16="http://schemas.microsoft.com/office/drawing/2014/main" id="{1F6A18D2-4E35-AD0C-6A97-C70F2FB0F28A}"/>
+              </a:ext>
+            </a:extLst>
+          </p:cNvPr>
+          <p:cNvPicPr>
+            <a:picLocks noChangeAspect="1"/>
+          </p:cNvPicPr>
+          <p:nvPr/>
+        </p:nvPicPr>
+        <p:blipFill>
+          <a:blip r:embed="rId6">
+            <a:extLst>
+              <a:ext uri="{28A0092B-C50C-407E-A947-70E740481C1C}">
+                <a14:useLocalDpi xmlns:a14="http://schemas.microsoft.com/office/drawing/2010/main" val="0"/>
+              </a:ext>
+            </a:extLst>
+          </a:blip>
+          <a:stretch>
+            <a:fillRect/>
+          </a:stretch>
+        </p:blipFill>
+        <p:spPr>
+          <a:xfrm>
+            <a:off x="0" y="2389696"/>
+            <a:ext cx="2978870" cy="2234153"/>
+          </a:xfrm>
+          <a:prstGeom prst="rect">
+            <a:avLst/>
+          </a:prstGeom>
+        </p:spPr>
+      </p:pic>
+      <p:pic>
+        <p:nvPicPr>
+          <p:cNvPr id="15" name="图片 14">
+            <a:extLst>
+              <a:ext uri="{FF2B5EF4-FFF2-40B4-BE49-F238E27FC236}">
+                <a16:creationId xmlns:a16="http://schemas.microsoft.com/office/drawing/2014/main" id="{85741B21-91A9-46AB-5C6A-AF5CDB51E53B}"/>
+              </a:ext>
+            </a:extLst>
+          </p:cNvPr>
+          <p:cNvPicPr>
+            <a:picLocks noChangeAspect="1"/>
+          </p:cNvPicPr>
+          <p:nvPr/>
+        </p:nvPicPr>
+        <p:blipFill>
+          <a:blip r:embed="rId7">
+            <a:extLst>
+              <a:ext uri="{28A0092B-C50C-407E-A947-70E740481C1C}">
+                <a14:useLocalDpi xmlns:a14="http://schemas.microsoft.com/office/drawing/2010/main" val="0"/>
+              </a:ext>
+            </a:extLst>
+          </a:blip>
+          <a:stretch>
+            <a:fillRect/>
+          </a:stretch>
+        </p:blipFill>
+        <p:spPr>
+          <a:xfrm>
+            <a:off x="2709888" y="2412332"/>
+            <a:ext cx="2978871" cy="2234153"/>
+          </a:xfrm>
+          <a:prstGeom prst="rect">
+            <a:avLst/>
+          </a:prstGeom>
+        </p:spPr>
+      </p:pic>
+      <p:pic>
+        <p:nvPicPr>
+          <p:cNvPr id="17" name="图片 16">
+            <a:extLst>
+              <a:ext uri="{FF2B5EF4-FFF2-40B4-BE49-F238E27FC236}">
+                <a16:creationId xmlns:a16="http://schemas.microsoft.com/office/drawing/2014/main" id="{E54F8391-5619-B7A4-9ACF-5E2E18E82E6E}"/>
+              </a:ext>
+            </a:extLst>
+          </p:cNvPr>
+          <p:cNvPicPr>
+            <a:picLocks noChangeAspect="1"/>
+          </p:cNvPicPr>
+          <p:nvPr/>
+        </p:nvPicPr>
+        <p:blipFill>
+          <a:blip r:embed="rId8">
+            <a:extLst>
+              <a:ext uri="{28A0092B-C50C-407E-A947-70E740481C1C}">
+                <a14:useLocalDpi xmlns:a14="http://schemas.microsoft.com/office/drawing/2010/main" val="0"/>
+              </a:ext>
+            </a:extLst>
+          </a:blip>
+          <a:stretch>
+            <a:fillRect/>
+          </a:stretch>
+        </p:blipFill>
+        <p:spPr>
+          <a:xfrm>
+            <a:off x="5620884" y="2460375"/>
+            <a:ext cx="2978870" cy="2234153"/>
+          </a:xfrm>
+          <a:prstGeom prst="rect">
+            <a:avLst/>
+          </a:prstGeom>
+        </p:spPr>
+      </p:pic>
+      <p:pic>
+        <p:nvPicPr>
+          <p:cNvPr id="19" name="图片 18">
+            <a:extLst>
+              <a:ext uri="{FF2B5EF4-FFF2-40B4-BE49-F238E27FC236}">
+                <a16:creationId xmlns:a16="http://schemas.microsoft.com/office/drawing/2014/main" id="{683044E0-35C0-5E0C-8C0C-2C3EE420CC6A}"/>
+              </a:ext>
+            </a:extLst>
+          </p:cNvPr>
+          <p:cNvPicPr>
+            <a:picLocks noChangeAspect="1"/>
+          </p:cNvPicPr>
+          <p:nvPr/>
+        </p:nvPicPr>
+        <p:blipFill>
+          <a:blip r:embed="rId9">
+            <a:extLst>
+              <a:ext uri="{28A0092B-C50C-407E-A947-70E740481C1C}">
+                <a14:useLocalDpi xmlns:a14="http://schemas.microsoft.com/office/drawing/2010/main" val="0"/>
+              </a:ext>
+            </a:extLst>
+          </a:blip>
+          <a:stretch>
+            <a:fillRect/>
+          </a:stretch>
+        </p:blipFill>
+        <p:spPr>
+          <a:xfrm>
+            <a:off x="8499200" y="2499963"/>
+            <a:ext cx="2926086" cy="2194565"/>
+          </a:xfrm>
+          <a:prstGeom prst="rect">
+            <a:avLst/>
+          </a:prstGeom>
+        </p:spPr>
+      </p:pic>
+      <p:pic>
+        <p:nvPicPr>
+          <p:cNvPr id="21" name="图片 20">
+            <a:extLst>
+              <a:ext uri="{FF2B5EF4-FFF2-40B4-BE49-F238E27FC236}">
+                <a16:creationId xmlns:a16="http://schemas.microsoft.com/office/drawing/2014/main" id="{FC207841-18CC-31A6-FFAD-A4FF3620E2C6}"/>
+              </a:ext>
+            </a:extLst>
+          </p:cNvPr>
+          <p:cNvPicPr>
+            <a:picLocks noChangeAspect="1"/>
+          </p:cNvPicPr>
+          <p:nvPr/>
+        </p:nvPicPr>
+        <p:blipFill>
+          <a:blip r:embed="rId10">
+            <a:extLst>
+              <a:ext uri="{28A0092B-C50C-407E-A947-70E740481C1C}">
+                <a14:useLocalDpi xmlns:a14="http://schemas.microsoft.com/office/drawing/2010/main" val="0"/>
+              </a:ext>
+            </a:extLst>
+          </a:blip>
+          <a:stretch>
+            <a:fillRect/>
+          </a:stretch>
+        </p:blipFill>
+        <p:spPr>
+          <a:xfrm>
+            <a:off x="1" y="4623848"/>
+            <a:ext cx="2978869" cy="2234152"/>
+          </a:xfrm>
+          <a:prstGeom prst="rect">
+            <a:avLst/>
+          </a:prstGeom>
+        </p:spPr>
+      </p:pic>
+      <p:pic>
+        <p:nvPicPr>
+          <p:cNvPr id="23" name="图片 22">
+            <a:extLst>
+              <a:ext uri="{FF2B5EF4-FFF2-40B4-BE49-F238E27FC236}">
+                <a16:creationId xmlns:a16="http://schemas.microsoft.com/office/drawing/2014/main" id="{37A6E777-24FF-1980-6836-70047F60FD6A}"/>
+              </a:ext>
+            </a:extLst>
+          </p:cNvPr>
+          <p:cNvPicPr>
+            <a:picLocks noChangeAspect="1"/>
+          </p:cNvPicPr>
+          <p:nvPr/>
+        </p:nvPicPr>
+        <p:blipFill>
+          <a:blip r:embed="rId11">
+            <a:extLst>
+              <a:ext uri="{28A0092B-C50C-407E-A947-70E740481C1C}">
+                <a14:useLocalDpi xmlns:a14="http://schemas.microsoft.com/office/drawing/2010/main" val="0"/>
+              </a:ext>
+            </a:extLst>
+          </a:blip>
+          <a:stretch>
+            <a:fillRect/>
+          </a:stretch>
+        </p:blipFill>
+        <p:spPr>
+          <a:xfrm>
+            <a:off x="2777766" y="4660621"/>
+            <a:ext cx="2910991" cy="2183243"/>
+          </a:xfrm>
+          <a:prstGeom prst="rect">
+            <a:avLst/>
+          </a:prstGeom>
+        </p:spPr>
+      </p:pic>
+      <p:sp>
+        <p:nvSpPr>
+          <p:cNvPr id="24" name="文本框 23">
+            <a:extLst>
+              <a:ext uri="{FF2B5EF4-FFF2-40B4-BE49-F238E27FC236}">
+                <a16:creationId xmlns:a16="http://schemas.microsoft.com/office/drawing/2014/main" id="{CCDF5CD8-BA21-7102-CF15-20921A056FAA}"/>
+              </a:ext>
+            </a:extLst>
+          </p:cNvPr>
+          <p:cNvSpPr txBox="1"/>
+          <p:nvPr/>
+        </p:nvSpPr>
+        <p:spPr>
+          <a:xfrm>
+            <a:off x="1272619" y="413849"/>
+            <a:ext cx="846707" cy="369332"/>
+          </a:xfrm>
+          <a:prstGeom prst="rect">
+            <a:avLst/>
+          </a:prstGeom>
+          <a:noFill/>
+        </p:spPr>
+        <p:txBody>
+          <a:bodyPr wrap="none" rtlCol="0">
+            <a:spAutoFit/>
+          </a:bodyPr>
+          <a:lstStyle/>
+          <a:p>
+            <a:r>
+              <a:rPr lang="en-US" altLang="zh-CN" dirty="0"/>
+              <a:t>C=150</a:t>
+            </a:r>
+            <a:endParaRPr lang="zh-CN" altLang="en-US" dirty="0"/>
+          </a:p>
+        </p:txBody>
+      </p:sp>
+      <p:sp>
+        <p:nvSpPr>
+          <p:cNvPr id="25" name="文本框 24">
+            <a:extLst>
+              <a:ext uri="{FF2B5EF4-FFF2-40B4-BE49-F238E27FC236}">
+                <a16:creationId xmlns:a16="http://schemas.microsoft.com/office/drawing/2014/main" id="{59428891-1160-D4A0-29C6-A931EBAE7905}"/>
+              </a:ext>
+            </a:extLst>
+          </p:cNvPr>
+          <p:cNvSpPr txBox="1"/>
+          <p:nvPr/>
+        </p:nvSpPr>
+        <p:spPr>
+          <a:xfrm>
+            <a:off x="4367753" y="409894"/>
+            <a:ext cx="846707" cy="369332"/>
+          </a:xfrm>
+          <a:prstGeom prst="rect">
+            <a:avLst/>
+          </a:prstGeom>
+          <a:noFill/>
+        </p:spPr>
+        <p:txBody>
+          <a:bodyPr wrap="none" rtlCol="0">
+            <a:spAutoFit/>
+          </a:bodyPr>
+          <a:lstStyle/>
+          <a:p>
+            <a:r>
+              <a:rPr lang="en-US" altLang="zh-CN" dirty="0"/>
+              <a:t>C=170</a:t>
+            </a:r>
+            <a:endParaRPr lang="zh-CN" altLang="en-US" dirty="0"/>
+          </a:p>
+        </p:txBody>
+      </p:sp>
+      <p:sp>
+        <p:nvSpPr>
+          <p:cNvPr id="26" name="文本框 25">
+            <a:extLst>
+              <a:ext uri="{FF2B5EF4-FFF2-40B4-BE49-F238E27FC236}">
+                <a16:creationId xmlns:a16="http://schemas.microsoft.com/office/drawing/2014/main" id="{05BDB539-1E30-63BA-83D0-764F031AD8FA}"/>
+              </a:ext>
+            </a:extLst>
+          </p:cNvPr>
+          <p:cNvSpPr txBox="1"/>
+          <p:nvPr/>
+        </p:nvSpPr>
+        <p:spPr>
+          <a:xfrm>
+            <a:off x="7216085" y="405939"/>
+            <a:ext cx="846707" cy="369332"/>
+          </a:xfrm>
+          <a:prstGeom prst="rect">
+            <a:avLst/>
+          </a:prstGeom>
+          <a:noFill/>
+        </p:spPr>
+        <p:txBody>
+          <a:bodyPr wrap="none" rtlCol="0">
+            <a:spAutoFit/>
+          </a:bodyPr>
+          <a:lstStyle/>
+          <a:p>
+            <a:r>
+              <a:rPr lang="en-US" altLang="zh-CN" dirty="0"/>
+              <a:t>C=180</a:t>
+            </a:r>
+            <a:endParaRPr lang="zh-CN" altLang="en-US" dirty="0"/>
+          </a:p>
+        </p:txBody>
+      </p:sp>
+      <p:sp>
+        <p:nvSpPr>
+          <p:cNvPr id="27" name="文本框 26">
+            <a:extLst>
+              <a:ext uri="{FF2B5EF4-FFF2-40B4-BE49-F238E27FC236}">
+                <a16:creationId xmlns:a16="http://schemas.microsoft.com/office/drawing/2014/main" id="{E9202A4B-2C1E-64A5-7511-A83215DB5C52}"/>
+              </a:ext>
+            </a:extLst>
+          </p:cNvPr>
+          <p:cNvSpPr txBox="1"/>
+          <p:nvPr/>
+        </p:nvSpPr>
+        <p:spPr>
+          <a:xfrm>
+            <a:off x="9850242" y="405939"/>
+            <a:ext cx="846707" cy="369332"/>
+          </a:xfrm>
+          <a:prstGeom prst="rect">
+            <a:avLst/>
+          </a:prstGeom>
+          <a:noFill/>
+        </p:spPr>
+        <p:txBody>
+          <a:bodyPr wrap="none" rtlCol="0">
+            <a:spAutoFit/>
+          </a:bodyPr>
+          <a:lstStyle/>
+          <a:p>
+            <a:r>
+              <a:rPr lang="en-US" altLang="zh-CN" dirty="0"/>
+              <a:t>C=190</a:t>
+            </a:r>
+            <a:endParaRPr lang="zh-CN" altLang="en-US" dirty="0"/>
+          </a:p>
+        </p:txBody>
+      </p:sp>
+      <p:sp>
+        <p:nvSpPr>
+          <p:cNvPr id="28" name="文本框 27">
+            <a:extLst>
+              <a:ext uri="{FF2B5EF4-FFF2-40B4-BE49-F238E27FC236}">
+                <a16:creationId xmlns:a16="http://schemas.microsoft.com/office/drawing/2014/main" id="{8356C84B-76EC-86D4-32D0-43F3073C724C}"/>
+              </a:ext>
+            </a:extLst>
+          </p:cNvPr>
+          <p:cNvSpPr txBox="1"/>
+          <p:nvPr/>
+        </p:nvSpPr>
+        <p:spPr>
+          <a:xfrm>
+            <a:off x="1283618" y="2821554"/>
+            <a:ext cx="846707" cy="369332"/>
+          </a:xfrm>
+          <a:prstGeom prst="rect">
+            <a:avLst/>
+          </a:prstGeom>
+          <a:noFill/>
+        </p:spPr>
+        <p:txBody>
+          <a:bodyPr wrap="none" rtlCol="0">
+            <a:spAutoFit/>
+          </a:bodyPr>
+          <a:lstStyle/>
+          <a:p>
+            <a:r>
+              <a:rPr lang="en-US" altLang="zh-CN" dirty="0"/>
+              <a:t>C=200</a:t>
+            </a:r>
+            <a:endParaRPr lang="zh-CN" altLang="en-US" dirty="0"/>
+          </a:p>
+        </p:txBody>
+      </p:sp>
+      <p:sp>
+        <p:nvSpPr>
+          <p:cNvPr id="29" name="文本框 28">
+            <a:extLst>
+              <a:ext uri="{FF2B5EF4-FFF2-40B4-BE49-F238E27FC236}">
+                <a16:creationId xmlns:a16="http://schemas.microsoft.com/office/drawing/2014/main" id="{90CE15A0-3C6A-894F-9348-00156006E583}"/>
+              </a:ext>
+            </a:extLst>
+          </p:cNvPr>
+          <p:cNvSpPr txBox="1"/>
+          <p:nvPr/>
+        </p:nvSpPr>
+        <p:spPr>
+          <a:xfrm>
+            <a:off x="3164307" y="3667668"/>
+            <a:ext cx="846707" cy="369332"/>
+          </a:xfrm>
+          <a:prstGeom prst="rect">
+            <a:avLst/>
+          </a:prstGeom>
+          <a:noFill/>
+        </p:spPr>
+        <p:txBody>
+          <a:bodyPr wrap="square" rtlCol="0">
+            <a:spAutoFit/>
+          </a:bodyPr>
+          <a:lstStyle/>
+          <a:p>
+            <a:r>
+              <a:rPr lang="en-US" altLang="zh-CN" dirty="0"/>
+              <a:t>C=210</a:t>
+            </a:r>
+            <a:endParaRPr lang="zh-CN" altLang="en-US" dirty="0"/>
+          </a:p>
+        </p:txBody>
+      </p:sp>
+      <p:sp>
+        <p:nvSpPr>
+          <p:cNvPr id="30" name="文本框 29">
+            <a:extLst>
+              <a:ext uri="{FF2B5EF4-FFF2-40B4-BE49-F238E27FC236}">
+                <a16:creationId xmlns:a16="http://schemas.microsoft.com/office/drawing/2014/main" id="{3023DF73-1BDA-D97D-DDF3-47FECB565143}"/>
+              </a:ext>
+            </a:extLst>
+          </p:cNvPr>
+          <p:cNvSpPr txBox="1"/>
+          <p:nvPr/>
+        </p:nvSpPr>
+        <p:spPr>
+          <a:xfrm>
+            <a:off x="6977406" y="2827025"/>
+            <a:ext cx="846707" cy="369332"/>
+          </a:xfrm>
+          <a:prstGeom prst="rect">
+            <a:avLst/>
+          </a:prstGeom>
+          <a:noFill/>
+        </p:spPr>
+        <p:txBody>
+          <a:bodyPr wrap="none" rtlCol="0">
+            <a:spAutoFit/>
+          </a:bodyPr>
+          <a:lstStyle/>
+          <a:p>
+            <a:r>
+              <a:rPr lang="en-US" altLang="zh-CN" dirty="0"/>
+              <a:t>C=220</a:t>
+            </a:r>
+            <a:endParaRPr lang="zh-CN" altLang="en-US" dirty="0"/>
+          </a:p>
+        </p:txBody>
+      </p:sp>
+      <p:sp>
+        <p:nvSpPr>
+          <p:cNvPr id="31" name="文本框 30">
+            <a:extLst>
+              <a:ext uri="{FF2B5EF4-FFF2-40B4-BE49-F238E27FC236}">
+                <a16:creationId xmlns:a16="http://schemas.microsoft.com/office/drawing/2014/main" id="{A3120A84-DCFA-6B61-E307-369F76E97D48}"/>
+              </a:ext>
+            </a:extLst>
+          </p:cNvPr>
+          <p:cNvSpPr txBox="1"/>
+          <p:nvPr/>
+        </p:nvSpPr>
+        <p:spPr>
+          <a:xfrm>
+            <a:off x="9711180" y="3006220"/>
+            <a:ext cx="846707" cy="369332"/>
+          </a:xfrm>
+          <a:prstGeom prst="rect">
+            <a:avLst/>
+          </a:prstGeom>
+          <a:noFill/>
+        </p:spPr>
+        <p:txBody>
+          <a:bodyPr wrap="none" rtlCol="0">
+            <a:spAutoFit/>
+          </a:bodyPr>
+          <a:lstStyle/>
+          <a:p>
+            <a:r>
+              <a:rPr lang="en-US" altLang="zh-CN" dirty="0"/>
+              <a:t>C=225</a:t>
+            </a:r>
+            <a:endParaRPr lang="zh-CN" altLang="en-US" dirty="0"/>
+          </a:p>
+        </p:txBody>
+      </p:sp>
+      <p:sp>
+        <p:nvSpPr>
+          <p:cNvPr id="32" name="文本框 31">
+            <a:extLst>
+              <a:ext uri="{FF2B5EF4-FFF2-40B4-BE49-F238E27FC236}">
+                <a16:creationId xmlns:a16="http://schemas.microsoft.com/office/drawing/2014/main" id="{B2649F54-853D-B89B-569C-1AD24CC59CD3}"/>
+              </a:ext>
+            </a:extLst>
+          </p:cNvPr>
+          <p:cNvSpPr txBox="1"/>
+          <p:nvPr/>
+        </p:nvSpPr>
+        <p:spPr>
+          <a:xfrm>
+            <a:off x="1267639" y="5191553"/>
+            <a:ext cx="846707" cy="369332"/>
+          </a:xfrm>
+          <a:prstGeom prst="rect">
+            <a:avLst/>
+          </a:prstGeom>
+          <a:noFill/>
+        </p:spPr>
+        <p:txBody>
+          <a:bodyPr wrap="none" rtlCol="0">
+            <a:spAutoFit/>
+          </a:bodyPr>
+          <a:lstStyle/>
+          <a:p>
+            <a:r>
+              <a:rPr lang="en-US" altLang="zh-CN" dirty="0"/>
+              <a:t>C=250</a:t>
+            </a:r>
+            <a:endParaRPr lang="zh-CN" altLang="en-US" dirty="0"/>
+          </a:p>
+        </p:txBody>
+      </p:sp>
+      <p:sp>
+        <p:nvSpPr>
+          <p:cNvPr id="33" name="文本框 32">
+            <a:extLst>
+              <a:ext uri="{FF2B5EF4-FFF2-40B4-BE49-F238E27FC236}">
+                <a16:creationId xmlns:a16="http://schemas.microsoft.com/office/drawing/2014/main" id="{E966779F-AD79-534D-68BA-17C883904902}"/>
+              </a:ext>
+            </a:extLst>
+          </p:cNvPr>
+          <p:cNvSpPr txBox="1"/>
+          <p:nvPr/>
+        </p:nvSpPr>
+        <p:spPr>
+          <a:xfrm>
+            <a:off x="4048613" y="5187800"/>
+            <a:ext cx="846707" cy="369332"/>
+          </a:xfrm>
+          <a:prstGeom prst="rect">
+            <a:avLst/>
+          </a:prstGeom>
+          <a:noFill/>
+        </p:spPr>
+        <p:txBody>
+          <a:bodyPr wrap="none" rtlCol="0">
+            <a:spAutoFit/>
+          </a:bodyPr>
+          <a:lstStyle/>
+          <a:p>
+            <a:r>
+              <a:rPr lang="en-US" altLang="zh-CN" dirty="0"/>
+              <a:t>C=300</a:t>
+            </a:r>
+            <a:endParaRPr lang="zh-CN" altLang="en-US" dirty="0"/>
+          </a:p>
+        </p:txBody>
+      </p:sp>
+    </p:spTree>
+    <p:extLst>
+      <p:ext uri="{BB962C8B-B14F-4D97-AF65-F5344CB8AC3E}">
+        <p14:creationId xmlns:p14="http://schemas.microsoft.com/office/powerpoint/2010/main" val="4126857892"/>
+      </p:ext>
+    </p:extLst>
+  </p:cSld>
+  <p:clrMapOvr>
+    <a:masterClrMapping/>
+  </p:clrMapOvr>
+</p:sld>
+</file>
+
+<file path=ppt/slides/slide2.xml><?xml version="1.0" encoding="utf-8"?>
+<p:sld xmlns:a="http://schemas.openxmlformats.org/drawingml/2006/main" xmlns:r="http://schemas.openxmlformats.org/officeDocument/2006/relationships" xmlns:p="http://schemas.openxmlformats.org/presentationml/2006/main">
+  <p:cSld>
+    <p:spTree>
+      <p:nvGrpSpPr>
+        <p:cNvPr id="1" name=""/>
+        <p:cNvGrpSpPr/>
+        <p:nvPr/>
+      </p:nvGrpSpPr>
+      <p:grpSpPr>
+        <a:xfrm>
+          <a:off x="0" y="0"/>
+          <a:ext cx="0" cy="0"/>
+          <a:chOff x="0" y="0"/>
+          <a:chExt cx="0" cy="0"/>
+        </a:xfrm>
+      </p:grpSpPr>
+      <p:pic>
+        <p:nvPicPr>
           <p:cNvPr id="6" name="图片 5">
             <a:extLst>
               <a:ext uri="{FF2B5EF4-FFF2-40B4-BE49-F238E27FC236}">
@@ -3929,7 +4680,7 @@
 </p:sld>
 </file>
 
-<file path=ppt/slides/slide2.xml><?xml version="1.0" encoding="utf-8"?>
+<file path=ppt/slides/slide3.xml><?xml version="1.0" encoding="utf-8"?>
 <p:sld xmlns:a="http://schemas.openxmlformats.org/drawingml/2006/main" xmlns:r="http://schemas.openxmlformats.org/officeDocument/2006/relationships" xmlns:p="http://schemas.openxmlformats.org/presentationml/2006/main">
   <p:cSld>
     <p:spTree>
@@ -4029,7 +4780,7 @@
 </p:sld>
 </file>
 
-<file path=ppt/slides/slide3.xml><?xml version="1.0" encoding="utf-8"?>
+<file path=ppt/slides/slide4.xml><?xml version="1.0" encoding="utf-8"?>
 <p:sld xmlns:a="http://schemas.openxmlformats.org/drawingml/2006/main" xmlns:r="http://schemas.openxmlformats.org/officeDocument/2006/relationships" xmlns:p="http://schemas.openxmlformats.org/presentationml/2006/main">
   <p:cSld>
     <p:spTree>
@@ -4161,8 +4912,8 @@
           </a:fontRef>
         </p:style>
       </p:cxnSp>
-      <mc:AlternateContent xmlns:mc="http://schemas.openxmlformats.org/markup-compatibility/2006">
-        <mc:Choice xmlns:a14="http://schemas.microsoft.com/office/drawing/2010/main" Requires="a14">
+      <mc:AlternateContent xmlns:mc="http://schemas.openxmlformats.org/markup-compatibility/2006" xmlns:a14="http://schemas.microsoft.com/office/drawing/2010/main">
+        <mc:Choice Requires="a14">
           <p:sp>
             <p:nvSpPr>
               <p:cNvPr id="10" name="文本框 9">
@@ -4233,7 +4984,7 @@
             </p:txBody>
           </p:sp>
         </mc:Choice>
-        <mc:Fallback>
+        <mc:Fallback xmlns="">
           <p:sp>
             <p:nvSpPr>
               <p:cNvPr id="10" name="文本框 9">
@@ -4327,7 +5078,7 @@
 </p:sld>
 </file>
 
-<file path=ppt/slides/slide4.xml><?xml version="1.0" encoding="utf-8"?>
+<file path=ppt/slides/slide5.xml><?xml version="1.0" encoding="utf-8"?>
 <p:sld xmlns:a="http://schemas.openxmlformats.org/drawingml/2006/main" xmlns:r="http://schemas.openxmlformats.org/officeDocument/2006/relationships" xmlns:p="http://schemas.openxmlformats.org/presentationml/2006/main">
   <p:cSld>
     <p:spTree>
@@ -4379,8 +5130,8 @@
           </a:prstGeom>
         </p:spPr>
       </p:pic>
-      <mc:AlternateContent xmlns:mc="http://schemas.openxmlformats.org/markup-compatibility/2006">
-        <mc:Choice xmlns:a14="http://schemas.microsoft.com/office/drawing/2010/main" Requires="a14">
+      <mc:AlternateContent xmlns:mc="http://schemas.openxmlformats.org/markup-compatibility/2006" xmlns:a14="http://schemas.microsoft.com/office/drawing/2010/main">
+        <mc:Choice Requires="a14">
           <p:sp>
             <p:nvSpPr>
               <p:cNvPr id="6" name="文本框 5">
@@ -4451,7 +5202,7 @@
             </p:txBody>
           </p:sp>
         </mc:Choice>
-        <mc:Fallback>
+        <mc:Fallback xmlns="">
           <p:sp>
             <p:nvSpPr>
               <p:cNvPr id="6" name="文本框 5">

</xml_diff>

<commit_message>
ci and quality for another p and phi
</commit_message>
<xml_diff>
--- a/tempo.pptx
+++ b/tempo.pptx
@@ -268,7 +268,7 @@
           <a:p>
             <a:fld id="{AFA471EA-8F32-4CD3-A574-0065AA557F40}" type="datetimeFigureOut">
               <a:rPr lang="zh-CN" altLang="en-US" smtClean="0"/>
-              <a:t>2024/10/22</a:t>
+              <a:t>2024/11/19</a:t>
             </a:fld>
             <a:endParaRPr lang="zh-CN" altLang="en-US"/>
           </a:p>
@@ -466,7 +466,7 @@
           <a:p>
             <a:fld id="{AFA471EA-8F32-4CD3-A574-0065AA557F40}" type="datetimeFigureOut">
               <a:rPr lang="zh-CN" altLang="en-US" smtClean="0"/>
-              <a:t>2024/10/22</a:t>
+              <a:t>2024/11/19</a:t>
             </a:fld>
             <a:endParaRPr lang="zh-CN" altLang="en-US"/>
           </a:p>
@@ -674,7 +674,7 @@
           <a:p>
             <a:fld id="{AFA471EA-8F32-4CD3-A574-0065AA557F40}" type="datetimeFigureOut">
               <a:rPr lang="zh-CN" altLang="en-US" smtClean="0"/>
-              <a:t>2024/10/22</a:t>
+              <a:t>2024/11/19</a:t>
             </a:fld>
             <a:endParaRPr lang="zh-CN" altLang="en-US"/>
           </a:p>
@@ -872,7 +872,7 @@
           <a:p>
             <a:fld id="{AFA471EA-8F32-4CD3-A574-0065AA557F40}" type="datetimeFigureOut">
               <a:rPr lang="zh-CN" altLang="en-US" smtClean="0"/>
-              <a:t>2024/10/22</a:t>
+              <a:t>2024/11/19</a:t>
             </a:fld>
             <a:endParaRPr lang="zh-CN" altLang="en-US"/>
           </a:p>
@@ -1147,7 +1147,7 @@
           <a:p>
             <a:fld id="{AFA471EA-8F32-4CD3-A574-0065AA557F40}" type="datetimeFigureOut">
               <a:rPr lang="zh-CN" altLang="en-US" smtClean="0"/>
-              <a:t>2024/10/22</a:t>
+              <a:t>2024/11/19</a:t>
             </a:fld>
             <a:endParaRPr lang="zh-CN" altLang="en-US"/>
           </a:p>
@@ -1412,7 +1412,7 @@
           <a:p>
             <a:fld id="{AFA471EA-8F32-4CD3-A574-0065AA557F40}" type="datetimeFigureOut">
               <a:rPr lang="zh-CN" altLang="en-US" smtClean="0"/>
-              <a:t>2024/10/22</a:t>
+              <a:t>2024/11/19</a:t>
             </a:fld>
             <a:endParaRPr lang="zh-CN" altLang="en-US"/>
           </a:p>
@@ -1824,7 +1824,7 @@
           <a:p>
             <a:fld id="{AFA471EA-8F32-4CD3-A574-0065AA557F40}" type="datetimeFigureOut">
               <a:rPr lang="zh-CN" altLang="en-US" smtClean="0"/>
-              <a:t>2024/10/22</a:t>
+              <a:t>2024/11/19</a:t>
             </a:fld>
             <a:endParaRPr lang="zh-CN" altLang="en-US"/>
           </a:p>
@@ -1965,7 +1965,7 @@
           <a:p>
             <a:fld id="{AFA471EA-8F32-4CD3-A574-0065AA557F40}" type="datetimeFigureOut">
               <a:rPr lang="zh-CN" altLang="en-US" smtClean="0"/>
-              <a:t>2024/10/22</a:t>
+              <a:t>2024/11/19</a:t>
             </a:fld>
             <a:endParaRPr lang="zh-CN" altLang="en-US"/>
           </a:p>
@@ -2078,7 +2078,7 @@
           <a:p>
             <a:fld id="{AFA471EA-8F32-4CD3-A574-0065AA557F40}" type="datetimeFigureOut">
               <a:rPr lang="zh-CN" altLang="en-US" smtClean="0"/>
-              <a:t>2024/10/22</a:t>
+              <a:t>2024/11/19</a:t>
             </a:fld>
             <a:endParaRPr lang="zh-CN" altLang="en-US"/>
           </a:p>
@@ -2389,7 +2389,7 @@
           <a:p>
             <a:fld id="{AFA471EA-8F32-4CD3-A574-0065AA557F40}" type="datetimeFigureOut">
               <a:rPr lang="zh-CN" altLang="en-US" smtClean="0"/>
-              <a:t>2024/10/22</a:t>
+              <a:t>2024/11/19</a:t>
             </a:fld>
             <a:endParaRPr lang="zh-CN" altLang="en-US"/>
           </a:p>
@@ -2677,7 +2677,7 @@
           <a:p>
             <a:fld id="{AFA471EA-8F32-4CD3-A574-0065AA557F40}" type="datetimeFigureOut">
               <a:rPr lang="zh-CN" altLang="en-US" smtClean="0"/>
-              <a:t>2024/10/22</a:t>
+              <a:t>2024/11/19</a:t>
             </a:fld>
             <a:endParaRPr lang="zh-CN" altLang="en-US"/>
           </a:p>
@@ -2918,7 +2918,7 @@
           <a:p>
             <a:fld id="{AFA471EA-8F32-4CD3-A574-0065AA557F40}" type="datetimeFigureOut">
               <a:rPr lang="zh-CN" altLang="en-US" smtClean="0"/>
-              <a:t>2024/10/22</a:t>
+              <a:t>2024/11/19</a:t>
             </a:fld>
             <a:endParaRPr lang="zh-CN" altLang="en-US"/>
           </a:p>
@@ -3399,7 +3399,7 @@
         </p:blipFill>
         <p:spPr>
           <a:xfrm>
-            <a:off x="2878318" y="-1"/>
+            <a:off x="2742567" y="48041"/>
             <a:ext cx="2978870" cy="2234153"/>
           </a:xfrm>
           <a:prstGeom prst="rect">

</xml_diff>

<commit_message>
plot std's trend over c0
</commit_message>
<xml_diff>
--- a/tempo.pptx
+++ b/tempo.pptx
@@ -15,6 +15,9 @@
     <p:sldId id="263" r:id="rId9"/>
     <p:sldId id="264" r:id="rId10"/>
     <p:sldId id="265" r:id="rId11"/>
+    <p:sldId id="266" r:id="rId12"/>
+    <p:sldId id="267" r:id="rId13"/>
+    <p:sldId id="268" r:id="rId14"/>
   </p:sldIdLst>
   <p:sldSz cx="12192000" cy="6858000"/>
   <p:notesSz cx="6858000" cy="9144000"/>
@@ -4467,6 +4470,533 @@
 </p:sld>
 </file>
 
+<file path=ppt/slides/slide11.xml><?xml version="1.0" encoding="utf-8"?>
+<p:sld xmlns:a="http://schemas.openxmlformats.org/drawingml/2006/main" xmlns:r="http://schemas.openxmlformats.org/officeDocument/2006/relationships" xmlns:p="http://schemas.openxmlformats.org/presentationml/2006/main">
+  <p:cSld>
+    <p:spTree>
+      <p:nvGrpSpPr>
+        <p:cNvPr id="1" name=""/>
+        <p:cNvGrpSpPr/>
+        <p:nvPr/>
+      </p:nvGrpSpPr>
+      <p:grpSpPr>
+        <a:xfrm>
+          <a:off x="0" y="0"/>
+          <a:ext cx="0" cy="0"/>
+          <a:chOff x="0" y="0"/>
+          <a:chExt cx="0" cy="0"/>
+        </a:xfrm>
+      </p:grpSpPr>
+      <p:sp>
+        <p:nvSpPr>
+          <p:cNvPr id="2" name="标题 1">
+            <a:extLst>
+              <a:ext uri="{FF2B5EF4-FFF2-40B4-BE49-F238E27FC236}">
+                <a16:creationId xmlns:a16="http://schemas.microsoft.com/office/drawing/2014/main" id="{9BC8671F-6742-BAB5-0B24-1E20F4A5C849}"/>
+              </a:ext>
+            </a:extLst>
+          </p:cNvPr>
+          <p:cNvSpPr>
+            <a:spLocks noGrp="1"/>
+          </p:cNvSpPr>
+          <p:nvPr>
+            <p:ph type="title"/>
+          </p:nvPr>
+        </p:nvSpPr>
+        <p:spPr/>
+        <p:txBody>
+          <a:bodyPr/>
+          <a:lstStyle/>
+          <a:p>
+            <a:r>
+              <a:rPr lang="en-US" altLang="zh-CN" dirty="0"/>
+              <a:t>MLA examination</a:t>
+            </a:r>
+            <a:endParaRPr lang="zh-CN" altLang="en-US" dirty="0"/>
+          </a:p>
+        </p:txBody>
+      </p:sp>
+      <p:sp>
+        <p:nvSpPr>
+          <p:cNvPr id="3" name="文本占位符 2">
+            <a:extLst>
+              <a:ext uri="{FF2B5EF4-FFF2-40B4-BE49-F238E27FC236}">
+                <a16:creationId xmlns:a16="http://schemas.microsoft.com/office/drawing/2014/main" id="{6EAC30BF-9A0A-469B-AA60-D2CDC4BF819E}"/>
+              </a:ext>
+            </a:extLst>
+          </p:cNvPr>
+          <p:cNvSpPr>
+            <a:spLocks noGrp="1"/>
+          </p:cNvSpPr>
+          <p:nvPr>
+            <p:ph type="body" idx="1"/>
+          </p:nvPr>
+        </p:nvSpPr>
+        <p:spPr/>
+        <p:txBody>
+          <a:bodyPr/>
+          <a:lstStyle/>
+          <a:p>
+            <a:endParaRPr lang="zh-CN" altLang="en-US"/>
+          </a:p>
+        </p:txBody>
+      </p:sp>
+    </p:spTree>
+    <p:extLst>
+      <p:ext uri="{BB962C8B-B14F-4D97-AF65-F5344CB8AC3E}">
+        <p14:creationId xmlns:p14="http://schemas.microsoft.com/office/powerpoint/2010/main" val="426464709"/>
+      </p:ext>
+    </p:extLst>
+  </p:cSld>
+  <p:clrMapOvr>
+    <a:masterClrMapping/>
+  </p:clrMapOvr>
+</p:sld>
+</file>
+
+<file path=ppt/slides/slide12.xml><?xml version="1.0" encoding="utf-8"?>
+<p:sld xmlns:a="http://schemas.openxmlformats.org/drawingml/2006/main" xmlns:r="http://schemas.openxmlformats.org/officeDocument/2006/relationships" xmlns:p="http://schemas.openxmlformats.org/presentationml/2006/main">
+  <p:cSld>
+    <p:spTree>
+      <p:nvGrpSpPr>
+        <p:cNvPr id="1" name=""/>
+        <p:cNvGrpSpPr/>
+        <p:nvPr/>
+      </p:nvGrpSpPr>
+      <p:grpSpPr>
+        <a:xfrm>
+          <a:off x="0" y="0"/>
+          <a:ext cx="0" cy="0"/>
+          <a:chOff x="0" y="0"/>
+          <a:chExt cx="0" cy="0"/>
+        </a:xfrm>
+      </p:grpSpPr>
+      <p:pic>
+        <p:nvPicPr>
+          <p:cNvPr id="3" name="图片 2">
+            <a:extLst>
+              <a:ext uri="{FF2B5EF4-FFF2-40B4-BE49-F238E27FC236}">
+                <a16:creationId xmlns:a16="http://schemas.microsoft.com/office/drawing/2014/main" id="{6BDD0703-9009-A674-4A77-7D6F8A736A45}"/>
+              </a:ext>
+            </a:extLst>
+          </p:cNvPr>
+          <p:cNvPicPr>
+            <a:picLocks noChangeAspect="1"/>
+          </p:cNvPicPr>
+          <p:nvPr/>
+        </p:nvPicPr>
+        <p:blipFill>
+          <a:blip r:embed="rId2">
+            <a:extLst>
+              <a:ext uri="{28A0092B-C50C-407E-A947-70E740481C1C}">
+                <a14:useLocalDpi xmlns:a14="http://schemas.microsoft.com/office/drawing/2010/main" val="0"/>
+              </a:ext>
+            </a:extLst>
+          </a:blip>
+          <a:stretch>
+            <a:fillRect/>
+          </a:stretch>
+        </p:blipFill>
+        <p:spPr>
+          <a:xfrm>
+            <a:off x="0" y="2679569"/>
+            <a:ext cx="5571241" cy="4178431"/>
+          </a:xfrm>
+          <a:prstGeom prst="rect">
+            <a:avLst/>
+          </a:prstGeom>
+        </p:spPr>
+      </p:pic>
+      <p:pic>
+        <p:nvPicPr>
+          <p:cNvPr id="5" name="图片 4">
+            <a:extLst>
+              <a:ext uri="{FF2B5EF4-FFF2-40B4-BE49-F238E27FC236}">
+                <a16:creationId xmlns:a16="http://schemas.microsoft.com/office/drawing/2014/main" id="{BA205C60-0589-2E3F-0F96-FE0F6B0DA604}"/>
+              </a:ext>
+            </a:extLst>
+          </p:cNvPr>
+          <p:cNvPicPr>
+            <a:picLocks noChangeAspect="1"/>
+          </p:cNvPicPr>
+          <p:nvPr/>
+        </p:nvPicPr>
+        <p:blipFill>
+          <a:blip r:embed="rId3">
+            <a:extLst>
+              <a:ext uri="{28A0092B-C50C-407E-A947-70E740481C1C}">
+                <a14:useLocalDpi xmlns:a14="http://schemas.microsoft.com/office/drawing/2010/main" val="0"/>
+              </a:ext>
+            </a:extLst>
+          </a:blip>
+          <a:srcRect t="4079" b="3836"/>
+          <a:stretch/>
+        </p:blipFill>
+        <p:spPr>
+          <a:xfrm>
+            <a:off x="7211505" y="34874"/>
+            <a:ext cx="4980495" cy="3439700"/>
+          </a:xfrm>
+          <a:prstGeom prst="rect">
+            <a:avLst/>
+          </a:prstGeom>
+        </p:spPr>
+      </p:pic>
+      <p:pic>
+        <p:nvPicPr>
+          <p:cNvPr id="7" name="图片 6">
+            <a:extLst>
+              <a:ext uri="{FF2B5EF4-FFF2-40B4-BE49-F238E27FC236}">
+                <a16:creationId xmlns:a16="http://schemas.microsoft.com/office/drawing/2014/main" id="{104D90F2-57EF-3B6D-A20B-3F13B476E7D7}"/>
+              </a:ext>
+            </a:extLst>
+          </p:cNvPr>
+          <p:cNvPicPr>
+            <a:picLocks noChangeAspect="1"/>
+          </p:cNvPicPr>
+          <p:nvPr/>
+        </p:nvPicPr>
+        <p:blipFill>
+          <a:blip r:embed="rId4">
+            <a:extLst>
+              <a:ext uri="{28A0092B-C50C-407E-A947-70E740481C1C}">
+                <a14:useLocalDpi xmlns:a14="http://schemas.microsoft.com/office/drawing/2010/main" val="0"/>
+              </a:ext>
+            </a:extLst>
+          </a:blip>
+          <a:srcRect t="6546" b="4399"/>
+          <a:stretch/>
+        </p:blipFill>
+        <p:spPr>
+          <a:xfrm>
+            <a:off x="7126310" y="3474574"/>
+            <a:ext cx="5065690" cy="3383426"/>
+          </a:xfrm>
+          <a:prstGeom prst="rect">
+            <a:avLst/>
+          </a:prstGeom>
+        </p:spPr>
+      </p:pic>
+      <p:sp>
+        <p:nvSpPr>
+          <p:cNvPr id="9" name="文本框 8">
+            <a:extLst>
+              <a:ext uri="{FF2B5EF4-FFF2-40B4-BE49-F238E27FC236}">
+                <a16:creationId xmlns:a16="http://schemas.microsoft.com/office/drawing/2014/main" id="{35330BB3-3030-38CB-566E-6EBDB60B2E39}"/>
+              </a:ext>
+            </a:extLst>
+          </p:cNvPr>
+          <p:cNvSpPr txBox="1"/>
+          <p:nvPr/>
+        </p:nvSpPr>
+        <p:spPr>
+          <a:xfrm>
+            <a:off x="96625" y="109029"/>
+            <a:ext cx="6094428" cy="2308324"/>
+          </a:xfrm>
+          <a:prstGeom prst="rect">
+            <a:avLst/>
+          </a:prstGeom>
+          <a:noFill/>
+        </p:spPr>
+        <p:txBody>
+          <a:bodyPr wrap="square">
+            <a:spAutoFit/>
+          </a:bodyPr>
+          <a:lstStyle/>
+          <a:p>
+            <a:r>
+              <a:rPr lang="zh-CN" altLang="en-US" dirty="0"/>
+              <a:t>C = 200</a:t>
+            </a:r>
+          </a:p>
+          <a:p>
+            <a:endParaRPr lang="zh-CN" altLang="en-US" dirty="0"/>
+          </a:p>
+          <a:p>
+            <a:r>
+              <a:rPr lang="zh-CN" altLang="en-US" dirty="0"/>
+              <a:t>Randomly bind receptors</a:t>
+            </a:r>
+          </a:p>
+          <a:p>
+            <a:r>
+              <a:rPr lang="zh-CN" altLang="en-US" dirty="0"/>
+              <a:t># gradient parameters  </a:t>
+            </a:r>
+          </a:p>
+          <a:p>
+            <a:r>
+              <a:rPr lang="zh-CN" altLang="en-US" dirty="0"/>
+              <a:t>    p = 1</a:t>
+            </a:r>
+          </a:p>
+          <a:p>
+            <a:r>
+              <a:rPr lang="zh-CN" altLang="en-US" dirty="0"/>
+              <a:t>    phi = np.pi / 4</a:t>
+            </a:r>
+          </a:p>
+          <a:p>
+            <a:r>
+              <a:rPr lang="zh-CN" altLang="en-US" dirty="0"/>
+              <a:t>    # bind parameters</a:t>
+            </a:r>
+          </a:p>
+          <a:p>
+            <a:r>
+              <a:rPr lang="zh-CN" altLang="en-US" dirty="0"/>
+              <a:t>    K_d = 5</a:t>
+            </a:r>
+          </a:p>
+        </p:txBody>
+      </p:sp>
+    </p:spTree>
+    <p:extLst>
+      <p:ext uri="{BB962C8B-B14F-4D97-AF65-F5344CB8AC3E}">
+        <p14:creationId xmlns:p14="http://schemas.microsoft.com/office/powerpoint/2010/main" val="308966845"/>
+      </p:ext>
+    </p:extLst>
+  </p:cSld>
+  <p:clrMapOvr>
+    <a:masterClrMapping/>
+  </p:clrMapOvr>
+</p:sld>
+</file>
+
+<file path=ppt/slides/slide13.xml><?xml version="1.0" encoding="utf-8"?>
+<p:sld xmlns:a="http://schemas.openxmlformats.org/drawingml/2006/main" xmlns:r="http://schemas.openxmlformats.org/officeDocument/2006/relationships" xmlns:p="http://schemas.openxmlformats.org/presentationml/2006/main">
+  <p:cSld>
+    <p:spTree>
+      <p:nvGrpSpPr>
+        <p:cNvPr id="1" name="">
+          <a:extLst>
+            <a:ext uri="{FF2B5EF4-FFF2-40B4-BE49-F238E27FC236}">
+              <a16:creationId xmlns:a16="http://schemas.microsoft.com/office/drawing/2014/main" id="{E85BA791-57A6-1ABB-8AC9-394075FC978E}"/>
+            </a:ext>
+          </a:extLst>
+        </p:cNvPr>
+        <p:cNvGrpSpPr/>
+        <p:nvPr/>
+      </p:nvGrpSpPr>
+      <p:grpSpPr>
+        <a:xfrm>
+          <a:off x="0" y="0"/>
+          <a:ext cx="0" cy="0"/>
+          <a:chOff x="0" y="0"/>
+          <a:chExt cx="0" cy="0"/>
+        </a:xfrm>
+      </p:grpSpPr>
+      <p:pic>
+        <p:nvPicPr>
+          <p:cNvPr id="3" name="图片 2">
+            <a:extLst>
+              <a:ext uri="{FF2B5EF4-FFF2-40B4-BE49-F238E27FC236}">
+                <a16:creationId xmlns:a16="http://schemas.microsoft.com/office/drawing/2014/main" id="{4A5B1443-F12D-BEFF-9DDD-2391F47ECCC4}"/>
+              </a:ext>
+            </a:extLst>
+          </p:cNvPr>
+          <p:cNvPicPr>
+            <a:picLocks noChangeAspect="1"/>
+          </p:cNvPicPr>
+          <p:nvPr/>
+        </p:nvPicPr>
+        <p:blipFill>
+          <a:blip r:embed="rId2">
+            <a:extLst>
+              <a:ext uri="{28A0092B-C50C-407E-A947-70E740481C1C}">
+                <a14:useLocalDpi xmlns:a14="http://schemas.microsoft.com/office/drawing/2010/main" val="0"/>
+              </a:ext>
+            </a:extLst>
+          </a:blip>
+          <a:srcRect/>
+          <a:stretch/>
+        </p:blipFill>
+        <p:spPr>
+          <a:xfrm>
+            <a:off x="0" y="2679569"/>
+            <a:ext cx="5571241" cy="4178430"/>
+          </a:xfrm>
+          <a:prstGeom prst="rect">
+            <a:avLst/>
+          </a:prstGeom>
+        </p:spPr>
+      </p:pic>
+      <p:pic>
+        <p:nvPicPr>
+          <p:cNvPr id="5" name="图片 4">
+            <a:extLst>
+              <a:ext uri="{FF2B5EF4-FFF2-40B4-BE49-F238E27FC236}">
+                <a16:creationId xmlns:a16="http://schemas.microsoft.com/office/drawing/2014/main" id="{45CB8E67-039E-4C43-70E2-8771E069D020}"/>
+              </a:ext>
+            </a:extLst>
+          </p:cNvPr>
+          <p:cNvPicPr>
+            <a:picLocks noChangeAspect="1"/>
+          </p:cNvPicPr>
+          <p:nvPr/>
+        </p:nvPicPr>
+        <p:blipFill>
+          <a:blip r:embed="rId3">
+            <a:extLst>
+              <a:ext uri="{28A0092B-C50C-407E-A947-70E740481C1C}">
+                <a14:useLocalDpi xmlns:a14="http://schemas.microsoft.com/office/drawing/2010/main" val="0"/>
+              </a:ext>
+            </a:extLst>
+          </a:blip>
+          <a:srcRect t="3958" b="3958"/>
+          <a:stretch/>
+        </p:blipFill>
+        <p:spPr>
+          <a:xfrm>
+            <a:off x="7211505" y="34874"/>
+            <a:ext cx="4980495" cy="3439700"/>
+          </a:xfrm>
+          <a:prstGeom prst="rect">
+            <a:avLst/>
+          </a:prstGeom>
+        </p:spPr>
+      </p:pic>
+      <p:pic>
+        <p:nvPicPr>
+          <p:cNvPr id="7" name="图片 6">
+            <a:extLst>
+              <a:ext uri="{FF2B5EF4-FFF2-40B4-BE49-F238E27FC236}">
+                <a16:creationId xmlns:a16="http://schemas.microsoft.com/office/drawing/2014/main" id="{DD24D2E4-E419-433F-CAA4-8B7E2FE00C2C}"/>
+              </a:ext>
+            </a:extLst>
+          </p:cNvPr>
+          <p:cNvPicPr>
+            <a:picLocks noChangeAspect="1"/>
+          </p:cNvPicPr>
+          <p:nvPr/>
+        </p:nvPicPr>
+        <p:blipFill>
+          <a:blip r:embed="rId4">
+            <a:extLst>
+              <a:ext uri="{28A0092B-C50C-407E-A947-70E740481C1C}">
+                <a14:useLocalDpi xmlns:a14="http://schemas.microsoft.com/office/drawing/2010/main" val="0"/>
+              </a:ext>
+            </a:extLst>
+          </a:blip>
+          <a:srcRect t="5473" b="5473"/>
+          <a:stretch/>
+        </p:blipFill>
+        <p:spPr>
+          <a:xfrm>
+            <a:off x="7126310" y="3474574"/>
+            <a:ext cx="5065690" cy="3383426"/>
+          </a:xfrm>
+          <a:prstGeom prst="rect">
+            <a:avLst/>
+          </a:prstGeom>
+        </p:spPr>
+      </p:pic>
+      <p:sp>
+        <p:nvSpPr>
+          <p:cNvPr id="9" name="文本框 8">
+            <a:extLst>
+              <a:ext uri="{FF2B5EF4-FFF2-40B4-BE49-F238E27FC236}">
+                <a16:creationId xmlns:a16="http://schemas.microsoft.com/office/drawing/2014/main" id="{F5B82179-AFE8-37BD-E16F-9B3B39D20248}"/>
+              </a:ext>
+            </a:extLst>
+          </p:cNvPr>
+          <p:cNvSpPr txBox="1"/>
+          <p:nvPr/>
+        </p:nvSpPr>
+        <p:spPr>
+          <a:xfrm>
+            <a:off x="115478" y="110288"/>
+            <a:ext cx="6094428" cy="2308324"/>
+          </a:xfrm>
+          <a:prstGeom prst="rect">
+            <a:avLst/>
+          </a:prstGeom>
+          <a:noFill/>
+        </p:spPr>
+        <p:txBody>
+          <a:bodyPr wrap="square">
+            <a:spAutoFit/>
+          </a:bodyPr>
+          <a:lstStyle/>
+          <a:p>
+            <a:r>
+              <a:rPr lang="zh-CN" altLang="en-US" dirty="0"/>
+              <a:t>C = 200</a:t>
+            </a:r>
+          </a:p>
+          <a:p>
+            <a:endParaRPr lang="zh-CN" altLang="en-US" dirty="0"/>
+          </a:p>
+          <a:p>
+            <a:r>
+              <a:rPr lang="zh-CN" altLang="en-US" dirty="0"/>
+              <a:t>Randomly bind receptors</a:t>
+            </a:r>
+          </a:p>
+          <a:p>
+            <a:r>
+              <a:rPr lang="zh-CN" altLang="en-US" dirty="0"/>
+              <a:t># gradient parameters  </a:t>
+            </a:r>
+          </a:p>
+          <a:p>
+            <a:r>
+              <a:rPr lang="zh-CN" altLang="en-US" dirty="0"/>
+              <a:t>    p = </a:t>
+            </a:r>
+            <a:r>
+              <a:rPr lang="en-US" altLang="zh-CN" dirty="0"/>
+              <a:t>2</a:t>
+            </a:r>
+            <a:endParaRPr lang="zh-CN" altLang="en-US" dirty="0"/>
+          </a:p>
+          <a:p>
+            <a:r>
+              <a:rPr lang="zh-CN" altLang="en-US" dirty="0"/>
+              <a:t>    phi = </a:t>
+            </a:r>
+            <a:r>
+              <a:rPr lang="en-US" altLang="zh-CN" dirty="0"/>
+              <a:t>2 * </a:t>
+            </a:r>
+            <a:r>
+              <a:rPr lang="zh-CN" altLang="en-US" dirty="0"/>
+              <a:t>np.pi / </a:t>
+            </a:r>
+            <a:r>
+              <a:rPr lang="en-US" altLang="zh-CN" dirty="0"/>
+              <a:t>3</a:t>
+            </a:r>
+            <a:endParaRPr lang="zh-CN" altLang="en-US" dirty="0"/>
+          </a:p>
+          <a:p>
+            <a:r>
+              <a:rPr lang="zh-CN" altLang="en-US" dirty="0"/>
+              <a:t>    # bind parameters</a:t>
+            </a:r>
+          </a:p>
+          <a:p>
+            <a:r>
+              <a:rPr lang="zh-CN" altLang="en-US" dirty="0"/>
+              <a:t>    K_d = 5</a:t>
+            </a:r>
+          </a:p>
+        </p:txBody>
+      </p:sp>
+    </p:spTree>
+    <p:extLst>
+      <p:ext uri="{BB962C8B-B14F-4D97-AF65-F5344CB8AC3E}">
+        <p14:creationId xmlns:p14="http://schemas.microsoft.com/office/powerpoint/2010/main" val="3644524527"/>
+      </p:ext>
+    </p:extLst>
+  </p:cSld>
+  <p:clrMapOvr>
+    <a:masterClrMapping/>
+  </p:clrMapOvr>
+</p:sld>
+</file>
+
 <file path=ppt/slides/slide2.xml><?xml version="1.0" encoding="utf-8"?>
 <p:sld xmlns:a="http://schemas.openxmlformats.org/drawingml/2006/main" xmlns:r="http://schemas.openxmlformats.org/officeDocument/2006/relationships" xmlns:p="http://schemas.openxmlformats.org/presentationml/2006/main">
   <p:cSld>

</xml_diff>